<commit_message>
Added various queries script
</commit_message>
<xml_diff>
--- a/Napredni SQL upiti.pptx
+++ b/Napredni SQL upiti.pptx
@@ -5,7 +5,7 @@
     <p:sldMasterId id="2147483660" r:id="rId1"/>
   </p:sldMasterIdLst>
   <p:notesMasterIdLst>
-    <p:notesMasterId r:id="rId8"/>
+    <p:notesMasterId r:id="rId9"/>
   </p:notesMasterIdLst>
   <p:sldIdLst>
     <p:sldId id="592" r:id="rId2"/>
@@ -14,28 +14,29 @@
     <p:sldId id="621" r:id="rId5"/>
     <p:sldId id="622" r:id="rId6"/>
     <p:sldId id="623" r:id="rId7"/>
+    <p:sldId id="624" r:id="rId8"/>
   </p:sldIdLst>
   <p:sldSz cx="9144000" cy="6858000" type="screen4x3"/>
   <p:notesSz cx="6858000" cy="9144000"/>
   <p:embeddedFontLst>
     <p:embeddedFont>
       <p:font typeface="Calibri" panose="020F0502020204030204" pitchFamily="34" charset="0"/>
-      <p:regular r:id="rId9"/>
-      <p:bold r:id="rId10"/>
-      <p:italic r:id="rId11"/>
-      <p:boldItalic r:id="rId12"/>
+      <p:regular r:id="rId10"/>
+      <p:bold r:id="rId11"/>
+      <p:italic r:id="rId12"/>
+      <p:boldItalic r:id="rId13"/>
     </p:embeddedFont>
     <p:embeddedFont>
       <p:font typeface="Fuse V.2 Display ExtraBold" panose="00000900000000000000" pitchFamily="50" charset="0"/>
-      <p:bold r:id="rId13"/>
-      <p:boldItalic r:id="rId14"/>
+      <p:bold r:id="rId14"/>
+      <p:boldItalic r:id="rId15"/>
     </p:embeddedFont>
     <p:embeddedFont>
       <p:font typeface="Source Sans Pro" panose="020B0503030403020204" pitchFamily="34" charset="0"/>
-      <p:regular r:id="rId15"/>
-      <p:bold r:id="rId16"/>
-      <p:italic r:id="rId17"/>
-      <p:boldItalic r:id="rId18"/>
+      <p:regular r:id="rId16"/>
+      <p:bold r:id="rId17"/>
+      <p:italic r:id="rId18"/>
+      <p:boldItalic r:id="rId19"/>
     </p:embeddedFont>
   </p:embeddedFontLst>
   <p:defaultTextStyle>
@@ -4426,6 +4427,110 @@
     <p:extLst>
       <p:ext uri="{BB962C8B-B14F-4D97-AF65-F5344CB8AC3E}">
         <p14:creationId xmlns:p14="http://schemas.microsoft.com/office/powerpoint/2010/main" val="3319454409"/>
+      </p:ext>
+    </p:extLst>
+  </p:cSld>
+  <p:clrMapOvr>
+    <a:masterClrMapping/>
+  </p:clrMapOvr>
+</p:sld>
+</file>
+
+<file path=ppt/slides/slide7.xml><?xml version="1.0" encoding="utf-8"?>
+<p:sld xmlns:a="http://schemas.openxmlformats.org/drawingml/2006/main" xmlns:r="http://schemas.openxmlformats.org/officeDocument/2006/relationships" xmlns:p="http://schemas.openxmlformats.org/presentationml/2006/main">
+  <p:cSld>
+    <p:spTree>
+      <p:nvGrpSpPr>
+        <p:cNvPr id="1" name=""/>
+        <p:cNvGrpSpPr/>
+        <p:nvPr/>
+      </p:nvGrpSpPr>
+      <p:grpSpPr>
+        <a:xfrm>
+          <a:off x="0" y="0"/>
+          <a:ext cx="0" cy="0"/>
+          <a:chOff x="0" y="0"/>
+          <a:chExt cx="0" cy="0"/>
+        </a:xfrm>
+      </p:grpSpPr>
+      <p:sp>
+        <p:nvSpPr>
+          <p:cNvPr id="2" name="Naslov 1">
+            <a:extLst>
+              <a:ext uri="{FF2B5EF4-FFF2-40B4-BE49-F238E27FC236}">
+                <a16:creationId xmlns:a16="http://schemas.microsoft.com/office/drawing/2014/main" id="{B2F7A7D6-767D-4FE4-BE11-36E46121B366}"/>
+              </a:ext>
+            </a:extLst>
+          </p:cNvPr>
+          <p:cNvSpPr>
+            <a:spLocks noGrp="1"/>
+          </p:cNvSpPr>
+          <p:nvPr>
+            <p:ph type="title"/>
+          </p:nvPr>
+        </p:nvSpPr>
+        <p:spPr/>
+        <p:txBody>
+          <a:bodyPr/>
+          <a:lstStyle/>
+          <a:p>
+            <a:r>
+              <a:rPr lang="hr-HR" dirty="0"/>
+              <a:t>3. Zadatak – upiti</a:t>
+            </a:r>
+          </a:p>
+        </p:txBody>
+      </p:sp>
+      <p:sp>
+        <p:nvSpPr>
+          <p:cNvPr id="3" name="Rezervirano mjesto sadržaja 2">
+            <a:extLst>
+              <a:ext uri="{FF2B5EF4-FFF2-40B4-BE49-F238E27FC236}">
+                <a16:creationId xmlns:a16="http://schemas.microsoft.com/office/drawing/2014/main" id="{B855190B-9F24-43C1-9F48-7E5572EE255F}"/>
+              </a:ext>
+            </a:extLst>
+          </p:cNvPr>
+          <p:cNvSpPr>
+            <a:spLocks noGrp="1"/>
+          </p:cNvSpPr>
+          <p:nvPr>
+            <p:ph idx="1"/>
+          </p:nvPr>
+        </p:nvSpPr>
+        <p:spPr/>
+        <p:txBody>
+          <a:bodyPr/>
+          <a:lstStyle/>
+          <a:p>
+            <a:r>
+              <a:rPr lang="hr-HR" dirty="0"/>
+              <a:t>Napisati iduće upite:</a:t>
+            </a:r>
+          </a:p>
+          <a:p>
+            <a:r>
+              <a:rPr lang="hr-HR" dirty="0"/>
+              <a:t>Dohvatiti sve ocjene (skupa sa studentima i predmetima) koje su veće od prosječne ocjene</a:t>
+            </a:r>
+          </a:p>
+          <a:p>
+            <a:r>
+              <a:rPr lang="hr-HR" dirty="0"/>
+              <a:t>Izbrojati koliko ima jedinstvenih vrijednosti ocjena</a:t>
+            </a:r>
+          </a:p>
+          <a:p>
+            <a:r>
+              <a:rPr lang="hr-HR" dirty="0"/>
+              <a:t>U novu tablicu izbaciti informacije o neprolaznim ocjenama u formatu ime studenta – prezime studenta – ime predmeta – datum upisa jedinice</a:t>
+            </a:r>
+          </a:p>
+        </p:txBody>
+      </p:sp>
+    </p:spTree>
+    <p:extLst>
+      <p:ext uri="{BB962C8B-B14F-4D97-AF65-F5344CB8AC3E}">
+        <p14:creationId xmlns:p14="http://schemas.microsoft.com/office/powerpoint/2010/main" val="375898568"/>
       </p:ext>
     </p:extLst>
   </p:cSld>

</xml_diff>

<commit_message>
Added group by script
</commit_message>
<xml_diff>
--- a/Napredni SQL upiti.pptx
+++ b/Napredni SQL upiti.pptx
@@ -5,7 +5,7 @@
     <p:sldMasterId id="2147483660" r:id="rId1"/>
   </p:sldMasterIdLst>
   <p:notesMasterIdLst>
-    <p:notesMasterId r:id="rId9"/>
+    <p:notesMasterId r:id="rId10"/>
   </p:notesMasterIdLst>
   <p:sldIdLst>
     <p:sldId id="592" r:id="rId2"/>
@@ -15,28 +15,29 @@
     <p:sldId id="622" r:id="rId6"/>
     <p:sldId id="623" r:id="rId7"/>
     <p:sldId id="624" r:id="rId8"/>
+    <p:sldId id="625" r:id="rId9"/>
   </p:sldIdLst>
   <p:sldSz cx="9144000" cy="6858000" type="screen4x3"/>
   <p:notesSz cx="6858000" cy="9144000"/>
   <p:embeddedFontLst>
     <p:embeddedFont>
       <p:font typeface="Calibri" panose="020F0502020204030204" pitchFamily="34" charset="0"/>
-      <p:regular r:id="rId10"/>
-      <p:bold r:id="rId11"/>
-      <p:italic r:id="rId12"/>
-      <p:boldItalic r:id="rId13"/>
+      <p:regular r:id="rId11"/>
+      <p:bold r:id="rId12"/>
+      <p:italic r:id="rId13"/>
+      <p:boldItalic r:id="rId14"/>
     </p:embeddedFont>
     <p:embeddedFont>
       <p:font typeface="Fuse V.2 Display ExtraBold" panose="00000900000000000000" pitchFamily="50" charset="0"/>
-      <p:bold r:id="rId14"/>
-      <p:boldItalic r:id="rId15"/>
+      <p:bold r:id="rId15"/>
+      <p:boldItalic r:id="rId16"/>
     </p:embeddedFont>
     <p:embeddedFont>
       <p:font typeface="Source Sans Pro" panose="020B0503030403020204" pitchFamily="34" charset="0"/>
-      <p:regular r:id="rId16"/>
-      <p:bold r:id="rId17"/>
-      <p:italic r:id="rId18"/>
-      <p:boldItalic r:id="rId19"/>
+      <p:regular r:id="rId17"/>
+      <p:bold r:id="rId18"/>
+      <p:italic r:id="rId19"/>
+      <p:boldItalic r:id="rId20"/>
     </p:embeddedFont>
   </p:embeddedFontLst>
   <p:defaultTextStyle>
@@ -236,7 +237,7 @@
           <a:p>
             <a:fld id="{8083A2DC-A5D8-42A4-B77F-6366681CACF9}" type="datetimeFigureOut">
               <a:rPr lang="en-US" smtClean="0"/>
-              <a:t>12/19/2020</a:t>
+              <a:t>12/20/2020</a:t>
             </a:fld>
             <a:endParaRPr lang="en-US" dirty="0"/>
           </a:p>
@@ -4531,6 +4532,117 @@
     <p:extLst>
       <p:ext uri="{BB962C8B-B14F-4D97-AF65-F5344CB8AC3E}">
         <p14:creationId xmlns:p14="http://schemas.microsoft.com/office/powerpoint/2010/main" val="375898568"/>
+      </p:ext>
+    </p:extLst>
+  </p:cSld>
+  <p:clrMapOvr>
+    <a:masterClrMapping/>
+  </p:clrMapOvr>
+</p:sld>
+</file>
+
+<file path=ppt/slides/slide8.xml><?xml version="1.0" encoding="utf-8"?>
+<p:sld xmlns:a="http://schemas.openxmlformats.org/drawingml/2006/main" xmlns:r="http://schemas.openxmlformats.org/officeDocument/2006/relationships" xmlns:p="http://schemas.openxmlformats.org/presentationml/2006/main">
+  <p:cSld>
+    <p:spTree>
+      <p:nvGrpSpPr>
+        <p:cNvPr id="1" name=""/>
+        <p:cNvGrpSpPr/>
+        <p:nvPr/>
+      </p:nvGrpSpPr>
+      <p:grpSpPr>
+        <a:xfrm>
+          <a:off x="0" y="0"/>
+          <a:ext cx="0" cy="0"/>
+          <a:chOff x="0" y="0"/>
+          <a:chExt cx="0" cy="0"/>
+        </a:xfrm>
+      </p:grpSpPr>
+      <p:sp>
+        <p:nvSpPr>
+          <p:cNvPr id="2" name="Naslov 1">
+            <a:extLst>
+              <a:ext uri="{FF2B5EF4-FFF2-40B4-BE49-F238E27FC236}">
+                <a16:creationId xmlns:a16="http://schemas.microsoft.com/office/drawing/2014/main" id="{B2F7A7D6-767D-4FE4-BE11-36E46121B366}"/>
+              </a:ext>
+            </a:extLst>
+          </p:cNvPr>
+          <p:cNvSpPr>
+            <a:spLocks noGrp="1"/>
+          </p:cNvSpPr>
+          <p:nvPr>
+            <p:ph type="title"/>
+          </p:nvPr>
+        </p:nvSpPr>
+        <p:spPr/>
+        <p:txBody>
+          <a:bodyPr/>
+          <a:lstStyle/>
+          <a:p>
+            <a:r>
+              <a:rPr lang="hr-HR" dirty="0"/>
+              <a:t>4. Zadatak – </a:t>
+            </a:r>
+            <a:r>
+              <a:rPr lang="hr-HR" dirty="0" err="1"/>
+              <a:t>group</a:t>
+            </a:r>
+            <a:r>
+              <a:rPr lang="hr-HR" dirty="0"/>
+              <a:t> </a:t>
+            </a:r>
+            <a:r>
+              <a:rPr lang="hr-HR" dirty="0" err="1"/>
+              <a:t>by</a:t>
+            </a:r>
+            <a:endParaRPr lang="hr-HR" dirty="0"/>
+          </a:p>
+        </p:txBody>
+      </p:sp>
+      <p:sp>
+        <p:nvSpPr>
+          <p:cNvPr id="3" name="Rezervirano mjesto sadržaja 2">
+            <a:extLst>
+              <a:ext uri="{FF2B5EF4-FFF2-40B4-BE49-F238E27FC236}">
+                <a16:creationId xmlns:a16="http://schemas.microsoft.com/office/drawing/2014/main" id="{B855190B-9F24-43C1-9F48-7E5572EE255F}"/>
+              </a:ext>
+            </a:extLst>
+          </p:cNvPr>
+          <p:cNvSpPr>
+            <a:spLocks noGrp="1"/>
+          </p:cNvSpPr>
+          <p:nvPr>
+            <p:ph idx="1"/>
+          </p:nvPr>
+        </p:nvSpPr>
+        <p:spPr/>
+        <p:txBody>
+          <a:bodyPr/>
+          <a:lstStyle/>
+          <a:p>
+            <a:r>
+              <a:rPr lang="hr-HR" dirty="0"/>
+              <a:t>Napisati iduće upite:</a:t>
+            </a:r>
+          </a:p>
+          <a:p>
+            <a:r>
+              <a:rPr lang="hr-HR" dirty="0"/>
+              <a:t>Koji će ispisati profesore i prosječnu ocjenu koju imaju studenti kod tog profesora</a:t>
+            </a:r>
+          </a:p>
+          <a:p>
+            <a:r>
+              <a:rPr lang="hr-HR" dirty="0"/>
+              <a:t>Koji će ispisati broj studenata po predmetu koji još nemaju upisanu ocjenu, ispisati samo predmete na kojima postoje takvi studenti</a:t>
+            </a:r>
+          </a:p>
+        </p:txBody>
+      </p:sp>
+    </p:spTree>
+    <p:extLst>
+      <p:ext uri="{BB962C8B-B14F-4D97-AF65-F5344CB8AC3E}">
+        <p14:creationId xmlns:p14="http://schemas.microsoft.com/office/powerpoint/2010/main" val="60440119"/>
       </p:ext>
     </p:extLst>
   </p:cSld>

</xml_diff>